<commit_message>
230 notes update -- skipping ECC
</commit_message>
<xml_diff>
--- a/_courses/comp230/f17/L50.pptx
+++ b/_courses/comp230/f17/L50.pptx
@@ -5,10 +5,10 @@
     <p:sldMasterId id="2147483651" r:id="rId1"/>
   </p:sldMasterIdLst>
   <p:notesMasterIdLst>
-    <p:notesMasterId r:id="rId25"/>
+    <p:notesMasterId r:id="rId28"/>
   </p:notesMasterIdLst>
   <p:handoutMasterIdLst>
-    <p:handoutMasterId r:id="rId26"/>
+    <p:handoutMasterId r:id="rId29"/>
   </p:handoutMasterIdLst>
   <p:sldIdLst>
     <p:sldId id="390" r:id="rId2"/>
@@ -34,6 +34,9 @@
     <p:sldId id="376" r:id="rId22"/>
     <p:sldId id="377" r:id="rId23"/>
     <p:sldId id="378" r:id="rId24"/>
+    <p:sldId id="404" r:id="rId25"/>
+    <p:sldId id="405" r:id="rId26"/>
+    <p:sldId id="406" r:id="rId27"/>
   </p:sldIdLst>
   <p:sldSz cx="9144000" cy="6858000" type="screen4x3"/>
   <p:notesSz cx="7099300" cy="10234613"/>
@@ -309,7 +312,7 @@
               <a:pPr>
                 <a:defRPr/>
               </a:pPr>
-              <a:t>21 November, 2017</a:t>
+              <a:t>25 November, 2017</a:t>
             </a:fld>
             <a:endParaRPr lang="en-AU"/>
           </a:p>
@@ -547,7 +550,7 @@
               <a:pPr>
                 <a:defRPr/>
               </a:pPr>
-              <a:t>21 November, 2017</a:t>
+              <a:t>25 November, 2017</a:t>
             </a:fld>
             <a:endParaRPr lang="en-AU"/>
           </a:p>
@@ -1022,7 +1025,7 @@
               <a:pPr>
                 <a:defRPr/>
               </a:pPr>
-              <a:t>21 November, 2017</a:t>
+              <a:t>25 November, 2017</a:t>
             </a:fld>
             <a:endParaRPr lang="en-AU"/>
           </a:p>
@@ -1390,7 +1393,7 @@
                 <a:latin typeface="Times New Roman" charset="0"/>
               </a:rPr>
               <a:pPr/>
-              <a:t>21 November, 2017</a:t>
+              <a:t>25 November, 2017</a:t>
             </a:fld>
             <a:endParaRPr lang="en-AU" altLang="en-US">
               <a:latin typeface="Times New Roman" charset="0"/>
@@ -2105,7 +2108,7 @@
                 <a:latin typeface="Times New Roman" charset="0"/>
               </a:rPr>
               <a:pPr/>
-              <a:t>21 November, 2017</a:t>
+              <a:t>25 November, 2017</a:t>
             </a:fld>
             <a:endParaRPr lang="en-AU" altLang="en-US">
               <a:latin typeface="Times New Roman" charset="0"/>
@@ -2812,7 +2815,7 @@
                 <a:latin typeface="Times New Roman" charset="0"/>
               </a:rPr>
               <a:pPr/>
-              <a:t>21 November, 2017</a:t>
+              <a:t>25 November, 2017</a:t>
             </a:fld>
             <a:endParaRPr lang="en-AU" altLang="en-US">
               <a:latin typeface="Times New Roman" charset="0"/>
@@ -3505,7 +3508,7 @@
                 <a:latin typeface="Times New Roman" charset="0"/>
               </a:rPr>
               <a:pPr/>
-              <a:t>21 November, 2017</a:t>
+              <a:t>25 November, 2017</a:t>
             </a:fld>
             <a:endParaRPr lang="en-AU" altLang="en-US">
               <a:latin typeface="Times New Roman" charset="0"/>
@@ -4193,7 +4196,7 @@
                 <a:latin typeface="Times New Roman" charset="0"/>
               </a:rPr>
               <a:pPr/>
-              <a:t>21 November, 2017</a:t>
+              <a:t>25 November, 2017</a:t>
             </a:fld>
             <a:endParaRPr lang="en-AU" altLang="en-US">
               <a:latin typeface="Times New Roman" charset="0"/>
@@ -4870,7 +4873,7 @@
                 <a:latin typeface="Times New Roman" charset="0"/>
               </a:rPr>
               <a:pPr/>
-              <a:t>21 November, 2017</a:t>
+              <a:t>25 November, 2017</a:t>
             </a:fld>
             <a:endParaRPr lang="en-AU" altLang="en-US">
               <a:latin typeface="Times New Roman" charset="0"/>
@@ -5535,7 +5538,7 @@
                 <a:latin typeface="Times New Roman" charset="0"/>
               </a:rPr>
               <a:pPr/>
-              <a:t>21 November, 2017</a:t>
+              <a:t>25 November, 2017</a:t>
             </a:fld>
             <a:endParaRPr lang="en-AU" altLang="en-US">
               <a:latin typeface="Times New Roman" charset="0"/>
@@ -6200,7 +6203,7 @@
                 <a:latin typeface="Times New Roman" charset="0"/>
               </a:rPr>
               <a:pPr/>
-              <a:t>21 November, 2017</a:t>
+              <a:t>25 November, 2017</a:t>
             </a:fld>
             <a:endParaRPr lang="en-AU" altLang="en-US">
               <a:latin typeface="Times New Roman" charset="0"/>
@@ -6865,7 +6868,7 @@
                 <a:latin typeface="Times New Roman" charset="0"/>
               </a:rPr>
               <a:pPr/>
-              <a:t>21 November, 2017</a:t>
+              <a:t>25 November, 2017</a:t>
             </a:fld>
             <a:endParaRPr lang="en-AU" altLang="en-US">
               <a:latin typeface="Times New Roman" charset="0"/>
@@ -7542,7 +7545,7 @@
                 <a:latin typeface="Times New Roman" charset="0"/>
               </a:rPr>
               <a:pPr/>
-              <a:t>21 November, 2017</a:t>
+              <a:t>25 November, 2017</a:t>
             </a:fld>
             <a:endParaRPr lang="en-AU" altLang="en-US">
               <a:latin typeface="Times New Roman" charset="0"/>
@@ -8207,7 +8210,7 @@
                 <a:latin typeface="Times New Roman" charset="0"/>
               </a:rPr>
               <a:pPr/>
-              <a:t>21 November, 2017</a:t>
+              <a:t>25 November, 2017</a:t>
             </a:fld>
             <a:endParaRPr lang="en-AU" altLang="en-US">
               <a:latin typeface="Times New Roman" charset="0"/>
@@ -8872,7 +8875,7 @@
                 <a:latin typeface="Times New Roman" charset="0"/>
               </a:rPr>
               <a:pPr/>
-              <a:t>21 November, 2017</a:t>
+              <a:t>25 November, 2017</a:t>
             </a:fld>
             <a:endParaRPr lang="en-AU" altLang="en-US">
               <a:latin typeface="Times New Roman" charset="0"/>
@@ -9542,7 +9545,7 @@
                 <a:latin typeface="Times New Roman" charset="0"/>
               </a:rPr>
               <a:pPr/>
-              <a:t>21 November, 2017</a:t>
+              <a:t>25 November, 2017</a:t>
             </a:fld>
             <a:endParaRPr lang="en-AU" altLang="en-US">
               <a:latin typeface="Times New Roman" charset="0"/>
@@ -10227,7 +10230,7 @@
                 <a:latin typeface="Times New Roman" charset="0"/>
               </a:rPr>
               <a:pPr/>
-              <a:t>21 November, 2017</a:t>
+              <a:t>25 November, 2017</a:t>
             </a:fld>
             <a:endParaRPr lang="en-AU" altLang="en-US">
               <a:latin typeface="Times New Roman" charset="0"/>
@@ -10892,7 +10895,7 @@
                 <a:latin typeface="Times New Roman" charset="0"/>
               </a:rPr>
               <a:pPr/>
-              <a:t>21 November, 2017</a:t>
+              <a:t>25 November, 2017</a:t>
             </a:fld>
             <a:endParaRPr lang="en-AU" altLang="en-US">
               <a:latin typeface="Times New Roman" charset="0"/>
@@ -11557,7 +11560,7 @@
                 <a:latin typeface="Times New Roman" charset="0"/>
               </a:rPr>
               <a:pPr/>
-              <a:t>21 November, 2017</a:t>
+              <a:t>25 November, 2017</a:t>
             </a:fld>
             <a:endParaRPr lang="en-AU" altLang="en-US">
               <a:latin typeface="Times New Roman" charset="0"/>
@@ -12259,7 +12262,7 @@
                 <a:latin typeface="Times New Roman" charset="0"/>
               </a:rPr>
               <a:pPr/>
-              <a:t>21 November, 2017</a:t>
+              <a:t>25 November, 2017</a:t>
             </a:fld>
             <a:endParaRPr lang="en-AU" altLang="en-US">
               <a:latin typeface="Times New Roman" charset="0"/>
@@ -22570,6 +22573,905 @@
 </p:sld>
 </file>
 
+<file path=ppt/slides/slide24.xml><?xml version="1.0" encoding="utf-8"?>
+<p:sld xmlns:a="http://schemas.openxmlformats.org/drawingml/2006/main" xmlns:r="http://schemas.openxmlformats.org/officeDocument/2006/relationships" xmlns:p="http://schemas.openxmlformats.org/presentationml/2006/main">
+  <p:cSld>
+    <p:spTree>
+      <p:nvGrpSpPr>
+        <p:cNvPr id="1" name=""/>
+        <p:cNvGrpSpPr/>
+        <p:nvPr/>
+      </p:nvGrpSpPr>
+      <p:grpSpPr>
+        <a:xfrm>
+          <a:off x="0" y="0"/>
+          <a:ext cx="0" cy="0"/>
+          <a:chOff x="0" y="0"/>
+          <a:chExt cx="0" cy="0"/>
+        </a:xfrm>
+      </p:grpSpPr>
+      <p:sp>
+        <p:nvSpPr>
+          <p:cNvPr id="64514" name="Title 1"/>
+          <p:cNvSpPr>
+            <a:spLocks noGrp="1"/>
+          </p:cNvSpPr>
+          <p:nvPr>
+            <p:ph type="title"/>
+          </p:nvPr>
+        </p:nvSpPr>
+        <p:spPr>
+          <a:xfrm>
+            <a:off x="684213" y="138113"/>
+            <a:ext cx="8259762" cy="769937"/>
+          </a:xfrm>
+        </p:spPr>
+        <p:txBody>
+          <a:bodyPr/>
+          <a:lstStyle/>
+          <a:p>
+            <a:r>
+              <a:rPr lang="en-US" altLang="en-US" dirty="0"/>
+              <a:t>Encoding </a:t>
+            </a:r>
+            <a:r>
+              <a:rPr lang="en-US" altLang="en-US" dirty="0" smtClean="0"/>
+              <a:t>ECC</a:t>
+            </a:r>
+            <a:endParaRPr lang="en-US" altLang="en-US" dirty="0"/>
+          </a:p>
+        </p:txBody>
+      </p:sp>
+      <p:sp>
+        <p:nvSpPr>
+          <p:cNvPr id="64515" name="Content Placeholder 2"/>
+          <p:cNvSpPr>
+            <a:spLocks noGrp="1"/>
+          </p:cNvSpPr>
+          <p:nvPr>
+            <p:ph idx="1"/>
+          </p:nvPr>
+        </p:nvSpPr>
+        <p:spPr/>
+        <p:txBody>
+          <a:bodyPr/>
+          <a:lstStyle/>
+          <a:p>
+            <a:r>
+              <a:rPr lang="en-US" altLang="en-US"/>
+              <a:t>To calculate Hamming code:</a:t>
+            </a:r>
+          </a:p>
+          <a:p>
+            <a:pPr lvl="1"/>
+            <a:r>
+              <a:rPr lang="en-US" altLang="en-US"/>
+              <a:t>Number bits from 1 on the left</a:t>
+            </a:r>
+          </a:p>
+          <a:p>
+            <a:pPr lvl="1"/>
+            <a:r>
+              <a:rPr lang="en-US" altLang="en-US"/>
+              <a:t>All bit positions that are a power 2 are parity bits</a:t>
+            </a:r>
+          </a:p>
+          <a:p>
+            <a:pPr lvl="1"/>
+            <a:r>
+              <a:rPr lang="en-US" altLang="en-US"/>
+              <a:t>Each parity bit checks certain data bits:</a:t>
+            </a:r>
+          </a:p>
+        </p:txBody>
+      </p:sp>
+      <p:sp>
+        <p:nvSpPr>
+          <p:cNvPr id="64516" name="Footer Placeholder 3"/>
+          <p:cNvSpPr>
+            <a:spLocks noGrp="1"/>
+          </p:cNvSpPr>
+          <p:nvPr>
+            <p:ph type="ftr" sz="quarter" idx="10"/>
+          </p:nvPr>
+        </p:nvSpPr>
+        <p:spPr>
+          <a:noFill/>
+          <a:ln/>
+          <a:extLst>
+            <a:ext uri="{909E8E84-426E-40DD-AFC4-6F175D3DCCD1}">
+              <a14:hiddenFill xmlns:a14="http://schemas.microsoft.com/office/drawing/2010/main">
+                <a:solidFill>
+                  <a:srgbClr val="FFFFFF"/>
+                </a:solidFill>
+              </a14:hiddenFill>
+            </a:ext>
+            <a:ext uri="{91240B29-F687-4F45-9708-019B960494DF}">
+              <a14:hiddenLine xmlns:a14="http://schemas.microsoft.com/office/drawing/2010/main" w="9525">
+                <a:solidFill>
+                  <a:srgbClr val="000000"/>
+                </a:solidFill>
+                <a:miter lim="800000"/>
+                <a:headEnd/>
+                <a:tailEnd/>
+              </a14:hiddenLine>
+            </a:ext>
+          </a:extLst>
+        </p:spPr>
+        <p:txBody>
+          <a:bodyPr/>
+          <a:lstStyle>
+            <a:lvl1pPr>
+              <a:defRPr>
+                <a:solidFill>
+                  <a:schemeClr val="tx1"/>
+                </a:solidFill>
+                <a:latin typeface="Arial" charset="0"/>
+              </a:defRPr>
+            </a:lvl1pPr>
+            <a:lvl2pPr marL="742950" indent="-285750">
+              <a:defRPr>
+                <a:solidFill>
+                  <a:schemeClr val="tx1"/>
+                </a:solidFill>
+                <a:latin typeface="Arial" charset="0"/>
+              </a:defRPr>
+            </a:lvl2pPr>
+            <a:lvl3pPr marL="1143000" indent="-228600">
+              <a:defRPr>
+                <a:solidFill>
+                  <a:schemeClr val="tx1"/>
+                </a:solidFill>
+                <a:latin typeface="Arial" charset="0"/>
+              </a:defRPr>
+            </a:lvl3pPr>
+            <a:lvl4pPr marL="1600200" indent="-228600">
+              <a:defRPr>
+                <a:solidFill>
+                  <a:schemeClr val="tx1"/>
+                </a:solidFill>
+                <a:latin typeface="Arial" charset="0"/>
+              </a:defRPr>
+            </a:lvl4pPr>
+            <a:lvl5pPr marL="2057400" indent="-228600">
+              <a:defRPr>
+                <a:solidFill>
+                  <a:schemeClr val="tx1"/>
+                </a:solidFill>
+                <a:latin typeface="Arial" charset="0"/>
+              </a:defRPr>
+            </a:lvl5pPr>
+            <a:lvl6pPr marL="2514600" indent="-228600" eaLnBrk="0" fontAlgn="base" hangingPunct="0">
+              <a:spcBef>
+                <a:spcPct val="0"/>
+              </a:spcBef>
+              <a:spcAft>
+                <a:spcPct val="0"/>
+              </a:spcAft>
+              <a:defRPr>
+                <a:solidFill>
+                  <a:schemeClr val="tx1"/>
+                </a:solidFill>
+                <a:latin typeface="Arial" charset="0"/>
+              </a:defRPr>
+            </a:lvl6pPr>
+            <a:lvl7pPr marL="2971800" indent="-228600" eaLnBrk="0" fontAlgn="base" hangingPunct="0">
+              <a:spcBef>
+                <a:spcPct val="0"/>
+              </a:spcBef>
+              <a:spcAft>
+                <a:spcPct val="0"/>
+              </a:spcAft>
+              <a:defRPr>
+                <a:solidFill>
+                  <a:schemeClr val="tx1"/>
+                </a:solidFill>
+                <a:latin typeface="Arial" charset="0"/>
+              </a:defRPr>
+            </a:lvl7pPr>
+            <a:lvl8pPr marL="3429000" indent="-228600" eaLnBrk="0" fontAlgn="base" hangingPunct="0">
+              <a:spcBef>
+                <a:spcPct val="0"/>
+              </a:spcBef>
+              <a:spcAft>
+                <a:spcPct val="0"/>
+              </a:spcAft>
+              <a:defRPr>
+                <a:solidFill>
+                  <a:schemeClr val="tx1"/>
+                </a:solidFill>
+                <a:latin typeface="Arial" charset="0"/>
+              </a:defRPr>
+            </a:lvl8pPr>
+            <a:lvl9pPr marL="3886200" indent="-228600" eaLnBrk="0" fontAlgn="base" hangingPunct="0">
+              <a:spcBef>
+                <a:spcPct val="0"/>
+              </a:spcBef>
+              <a:spcAft>
+                <a:spcPct val="0"/>
+              </a:spcAft>
+              <a:defRPr>
+                <a:solidFill>
+                  <a:schemeClr val="tx1"/>
+                </a:solidFill>
+                <a:latin typeface="Arial" charset="0"/>
+              </a:defRPr>
+            </a:lvl9pPr>
+          </a:lstStyle>
+          <a:p>
+            <a:r>
+              <a:rPr lang="en-AU" altLang="en-US"/>
+              <a:t>Chapter 5 — Large and Fast: Exploiting Memory Hierarchy — </a:t>
+            </a:r>
+            <a:fld id="{75C256D1-59C4-A946-84D6-9BDF1A4B442F}" type="slidenum">
+              <a:rPr lang="en-AU" altLang="en-US"/>
+              <a:pPr/>
+              <a:t>24</a:t>
+            </a:fld>
+            <a:endParaRPr lang="en-AU" altLang="en-US"/>
+          </a:p>
+        </p:txBody>
+      </p:sp>
+      <p:pic>
+        <p:nvPicPr>
+          <p:cNvPr id="64517" name="Picture 2"/>
+          <p:cNvPicPr>
+            <a:picLocks noChangeAspect="1" noChangeArrowheads="1"/>
+          </p:cNvPicPr>
+          <p:nvPr/>
+        </p:nvPicPr>
+        <p:blipFill>
+          <a:blip r:embed="rId2">
+            <a:extLst>
+              <a:ext uri="{28A0092B-C50C-407E-A947-70E740481C1C}">
+                <a14:useLocalDpi xmlns:a14="http://schemas.microsoft.com/office/drawing/2010/main" val="0"/>
+              </a:ext>
+            </a:extLst>
+          </a:blip>
+          <a:srcRect/>
+          <a:stretch>
+            <a:fillRect/>
+          </a:stretch>
+        </p:blipFill>
+        <p:spPr bwMode="auto">
+          <a:xfrm>
+            <a:off x="1547813" y="3933825"/>
+            <a:ext cx="6048375" cy="2022475"/>
+          </a:xfrm>
+          <a:prstGeom prst="rect">
+            <a:avLst/>
+          </a:prstGeom>
+          <a:noFill/>
+          <a:ln>
+            <a:noFill/>
+          </a:ln>
+          <a:extLst>
+            <a:ext uri="{909E8E84-426E-40DD-AFC4-6F175D3DCCD1}">
+              <a14:hiddenFill xmlns:a14="http://schemas.microsoft.com/office/drawing/2010/main">
+                <a:solidFill>
+                  <a:srgbClr val="FFFFFF"/>
+                </a:solidFill>
+              </a14:hiddenFill>
+            </a:ext>
+            <a:ext uri="{91240B29-F687-4F45-9708-019B960494DF}">
+              <a14:hiddenLine xmlns:a14="http://schemas.microsoft.com/office/drawing/2010/main" w="9525">
+                <a:solidFill>
+                  <a:srgbClr val="000000"/>
+                </a:solidFill>
+                <a:miter lim="800000"/>
+                <a:headEnd/>
+                <a:tailEnd/>
+              </a14:hiddenLine>
+            </a:ext>
+          </a:extLst>
+        </p:spPr>
+      </p:pic>
+    </p:spTree>
+    <p:extLst>
+      <p:ext uri="{BB962C8B-B14F-4D97-AF65-F5344CB8AC3E}">
+        <p14:creationId xmlns:p14="http://schemas.microsoft.com/office/powerpoint/2010/main" val="1416705737"/>
+      </p:ext>
+    </p:extLst>
+  </p:cSld>
+  <p:clrMapOvr>
+    <a:masterClrMapping/>
+  </p:clrMapOvr>
+  <p:timing>
+    <p:tnLst>
+      <p:par>
+        <p:cTn id="1" dur="indefinite" restart="never" nodeType="tmRoot"/>
+      </p:par>
+    </p:tnLst>
+  </p:timing>
+</p:sld>
+</file>
+
+<file path=ppt/slides/slide25.xml><?xml version="1.0" encoding="utf-8"?>
+<p:sld xmlns:a="http://schemas.openxmlformats.org/drawingml/2006/main" xmlns:r="http://schemas.openxmlformats.org/officeDocument/2006/relationships" xmlns:p="http://schemas.openxmlformats.org/presentationml/2006/main">
+  <p:cSld>
+    <p:spTree>
+      <p:nvGrpSpPr>
+        <p:cNvPr id="1" name=""/>
+        <p:cNvGrpSpPr/>
+        <p:nvPr/>
+      </p:nvGrpSpPr>
+      <p:grpSpPr>
+        <a:xfrm>
+          <a:off x="0" y="0"/>
+          <a:ext cx="0" cy="0"/>
+          <a:chOff x="0" y="0"/>
+          <a:chExt cx="0" cy="0"/>
+        </a:xfrm>
+      </p:grpSpPr>
+      <p:sp>
+        <p:nvSpPr>
+          <p:cNvPr id="65538" name="Title 1"/>
+          <p:cNvSpPr>
+            <a:spLocks noGrp="1"/>
+          </p:cNvSpPr>
+          <p:nvPr>
+            <p:ph type="title"/>
+          </p:nvPr>
+        </p:nvSpPr>
+        <p:spPr/>
+        <p:txBody>
+          <a:bodyPr/>
+          <a:lstStyle/>
+          <a:p>
+            <a:r>
+              <a:rPr lang="en-US" altLang="en-US"/>
+              <a:t>Decoding SEC</a:t>
+            </a:r>
+          </a:p>
+        </p:txBody>
+      </p:sp>
+      <p:sp>
+        <p:nvSpPr>
+          <p:cNvPr id="65539" name="Content Placeholder 2"/>
+          <p:cNvSpPr>
+            <a:spLocks noGrp="1"/>
+          </p:cNvSpPr>
+          <p:nvPr>
+            <p:ph idx="1"/>
+          </p:nvPr>
+        </p:nvSpPr>
+        <p:spPr/>
+        <p:txBody>
+          <a:bodyPr/>
+          <a:lstStyle/>
+          <a:p>
+            <a:r>
+              <a:rPr lang="en-US" altLang="en-US"/>
+              <a:t>Value of parity bits indicates which bits are in error</a:t>
+            </a:r>
+          </a:p>
+          <a:p>
+            <a:pPr lvl="1"/>
+            <a:r>
+              <a:rPr lang="en-US" altLang="en-US"/>
+              <a:t>Use numbering from encoding procedure</a:t>
+            </a:r>
+          </a:p>
+          <a:p>
+            <a:pPr lvl="1"/>
+            <a:r>
+              <a:rPr lang="en-US" altLang="en-US"/>
+              <a:t>E.g.</a:t>
+            </a:r>
+          </a:p>
+          <a:p>
+            <a:pPr lvl="2"/>
+            <a:r>
+              <a:rPr lang="en-US" altLang="en-US"/>
+              <a:t>Parity bits = 0000 indicates no error</a:t>
+            </a:r>
+          </a:p>
+          <a:p>
+            <a:pPr lvl="2"/>
+            <a:r>
+              <a:rPr lang="en-US" altLang="en-US"/>
+              <a:t>Parity bits = 1010 indicates bit 10 was flipped</a:t>
+            </a:r>
+          </a:p>
+        </p:txBody>
+      </p:sp>
+      <p:sp>
+        <p:nvSpPr>
+          <p:cNvPr id="65540" name="Footer Placeholder 3"/>
+          <p:cNvSpPr>
+            <a:spLocks noGrp="1"/>
+          </p:cNvSpPr>
+          <p:nvPr>
+            <p:ph type="ftr" sz="quarter" idx="10"/>
+          </p:nvPr>
+        </p:nvSpPr>
+        <p:spPr>
+          <a:noFill/>
+          <a:ln/>
+          <a:extLst>
+            <a:ext uri="{909E8E84-426E-40DD-AFC4-6F175D3DCCD1}">
+              <a14:hiddenFill xmlns:a14="http://schemas.microsoft.com/office/drawing/2010/main">
+                <a:solidFill>
+                  <a:srgbClr val="FFFFFF"/>
+                </a:solidFill>
+              </a14:hiddenFill>
+            </a:ext>
+            <a:ext uri="{91240B29-F687-4F45-9708-019B960494DF}">
+              <a14:hiddenLine xmlns:a14="http://schemas.microsoft.com/office/drawing/2010/main" w="9525">
+                <a:solidFill>
+                  <a:srgbClr val="000000"/>
+                </a:solidFill>
+                <a:miter lim="800000"/>
+                <a:headEnd/>
+                <a:tailEnd/>
+              </a14:hiddenLine>
+            </a:ext>
+          </a:extLst>
+        </p:spPr>
+        <p:txBody>
+          <a:bodyPr/>
+          <a:lstStyle>
+            <a:lvl1pPr>
+              <a:defRPr>
+                <a:solidFill>
+                  <a:schemeClr val="tx1"/>
+                </a:solidFill>
+                <a:latin typeface="Arial" charset="0"/>
+              </a:defRPr>
+            </a:lvl1pPr>
+            <a:lvl2pPr marL="742950" indent="-285750">
+              <a:defRPr>
+                <a:solidFill>
+                  <a:schemeClr val="tx1"/>
+                </a:solidFill>
+                <a:latin typeface="Arial" charset="0"/>
+              </a:defRPr>
+            </a:lvl2pPr>
+            <a:lvl3pPr marL="1143000" indent="-228600">
+              <a:defRPr>
+                <a:solidFill>
+                  <a:schemeClr val="tx1"/>
+                </a:solidFill>
+                <a:latin typeface="Arial" charset="0"/>
+              </a:defRPr>
+            </a:lvl3pPr>
+            <a:lvl4pPr marL="1600200" indent="-228600">
+              <a:defRPr>
+                <a:solidFill>
+                  <a:schemeClr val="tx1"/>
+                </a:solidFill>
+                <a:latin typeface="Arial" charset="0"/>
+              </a:defRPr>
+            </a:lvl4pPr>
+            <a:lvl5pPr marL="2057400" indent="-228600">
+              <a:defRPr>
+                <a:solidFill>
+                  <a:schemeClr val="tx1"/>
+                </a:solidFill>
+                <a:latin typeface="Arial" charset="0"/>
+              </a:defRPr>
+            </a:lvl5pPr>
+            <a:lvl6pPr marL="2514600" indent="-228600" eaLnBrk="0" fontAlgn="base" hangingPunct="0">
+              <a:spcBef>
+                <a:spcPct val="0"/>
+              </a:spcBef>
+              <a:spcAft>
+                <a:spcPct val="0"/>
+              </a:spcAft>
+              <a:defRPr>
+                <a:solidFill>
+                  <a:schemeClr val="tx1"/>
+                </a:solidFill>
+                <a:latin typeface="Arial" charset="0"/>
+              </a:defRPr>
+            </a:lvl6pPr>
+            <a:lvl7pPr marL="2971800" indent="-228600" eaLnBrk="0" fontAlgn="base" hangingPunct="0">
+              <a:spcBef>
+                <a:spcPct val="0"/>
+              </a:spcBef>
+              <a:spcAft>
+                <a:spcPct val="0"/>
+              </a:spcAft>
+              <a:defRPr>
+                <a:solidFill>
+                  <a:schemeClr val="tx1"/>
+                </a:solidFill>
+                <a:latin typeface="Arial" charset="0"/>
+              </a:defRPr>
+            </a:lvl7pPr>
+            <a:lvl8pPr marL="3429000" indent="-228600" eaLnBrk="0" fontAlgn="base" hangingPunct="0">
+              <a:spcBef>
+                <a:spcPct val="0"/>
+              </a:spcBef>
+              <a:spcAft>
+                <a:spcPct val="0"/>
+              </a:spcAft>
+              <a:defRPr>
+                <a:solidFill>
+                  <a:schemeClr val="tx1"/>
+                </a:solidFill>
+                <a:latin typeface="Arial" charset="0"/>
+              </a:defRPr>
+            </a:lvl8pPr>
+            <a:lvl9pPr marL="3886200" indent="-228600" eaLnBrk="0" fontAlgn="base" hangingPunct="0">
+              <a:spcBef>
+                <a:spcPct val="0"/>
+              </a:spcBef>
+              <a:spcAft>
+                <a:spcPct val="0"/>
+              </a:spcAft>
+              <a:defRPr>
+                <a:solidFill>
+                  <a:schemeClr val="tx1"/>
+                </a:solidFill>
+                <a:latin typeface="Arial" charset="0"/>
+              </a:defRPr>
+            </a:lvl9pPr>
+          </a:lstStyle>
+          <a:p>
+            <a:r>
+              <a:rPr lang="en-AU" altLang="en-US"/>
+              <a:t>Chapter 5 — Large and Fast: Exploiting Memory Hierarchy — </a:t>
+            </a:r>
+            <a:fld id="{B8C04E3C-1542-0E44-A439-3CB238901B7A}" type="slidenum">
+              <a:rPr lang="en-AU" altLang="en-US"/>
+              <a:pPr/>
+              <a:t>25</a:t>
+            </a:fld>
+            <a:endParaRPr lang="en-AU" altLang="en-US"/>
+          </a:p>
+        </p:txBody>
+      </p:sp>
+    </p:spTree>
+    <p:extLst>
+      <p:ext uri="{BB962C8B-B14F-4D97-AF65-F5344CB8AC3E}">
+        <p14:creationId xmlns:p14="http://schemas.microsoft.com/office/powerpoint/2010/main" val="1422127470"/>
+      </p:ext>
+    </p:extLst>
+  </p:cSld>
+  <p:clrMapOvr>
+    <a:masterClrMapping/>
+  </p:clrMapOvr>
+  <p:timing>
+    <p:tnLst>
+      <p:par>
+        <p:cTn id="1" dur="indefinite" restart="never" nodeType="tmRoot"/>
+      </p:par>
+    </p:tnLst>
+  </p:timing>
+</p:sld>
+</file>
+
+<file path=ppt/slides/slide26.xml><?xml version="1.0" encoding="utf-8"?>
+<p:sld xmlns:a="http://schemas.openxmlformats.org/drawingml/2006/main" xmlns:r="http://schemas.openxmlformats.org/officeDocument/2006/relationships" xmlns:p="http://schemas.openxmlformats.org/presentationml/2006/main">
+  <p:cSld>
+    <p:spTree>
+      <p:nvGrpSpPr>
+        <p:cNvPr id="1" name=""/>
+        <p:cNvGrpSpPr/>
+        <p:nvPr/>
+      </p:nvGrpSpPr>
+      <p:grpSpPr>
+        <a:xfrm>
+          <a:off x="0" y="0"/>
+          <a:ext cx="0" cy="0"/>
+          <a:chOff x="0" y="0"/>
+          <a:chExt cx="0" cy="0"/>
+        </a:xfrm>
+      </p:grpSpPr>
+      <p:sp>
+        <p:nvSpPr>
+          <p:cNvPr id="66562" name="Title 1"/>
+          <p:cNvSpPr>
+            <a:spLocks noGrp="1"/>
+          </p:cNvSpPr>
+          <p:nvPr>
+            <p:ph type="title"/>
+          </p:nvPr>
+        </p:nvSpPr>
+        <p:spPr/>
+        <p:txBody>
+          <a:bodyPr/>
+          <a:lstStyle/>
+          <a:p>
+            <a:r>
+              <a:rPr lang="en-US" altLang="en-US"/>
+              <a:t>SEC/DEC Code</a:t>
+            </a:r>
+          </a:p>
+        </p:txBody>
+      </p:sp>
+      <p:sp>
+        <p:nvSpPr>
+          <p:cNvPr id="66563" name="Content Placeholder 2"/>
+          <p:cNvSpPr>
+            <a:spLocks noGrp="1"/>
+          </p:cNvSpPr>
+          <p:nvPr>
+            <p:ph idx="1"/>
+          </p:nvPr>
+        </p:nvSpPr>
+        <p:spPr/>
+        <p:txBody>
+          <a:bodyPr/>
+          <a:lstStyle/>
+          <a:p>
+            <a:r>
+              <a:rPr lang="en-US" altLang="en-US" sz="2800"/>
+              <a:t>Add an additional parity bit for the whole word (p</a:t>
+            </a:r>
+            <a:r>
+              <a:rPr lang="en-US" altLang="en-US" sz="2800" baseline="-25000"/>
+              <a:t>n</a:t>
+            </a:r>
+            <a:r>
+              <a:rPr lang="en-US" altLang="en-US" sz="2800"/>
+              <a:t>)</a:t>
+            </a:r>
+          </a:p>
+          <a:p>
+            <a:r>
+              <a:rPr lang="en-US" altLang="en-US" sz="2800"/>
+              <a:t>Make Hamming distance = 4</a:t>
+            </a:r>
+          </a:p>
+          <a:p>
+            <a:r>
+              <a:rPr lang="en-US" altLang="en-US" sz="2800"/>
+              <a:t>Decoding:</a:t>
+            </a:r>
+          </a:p>
+          <a:p>
+            <a:pPr lvl="1"/>
+            <a:r>
+              <a:rPr lang="en-US" altLang="en-US" sz="2400"/>
+              <a:t>Let H = SEC parity bits</a:t>
+            </a:r>
+          </a:p>
+          <a:p>
+            <a:pPr lvl="2"/>
+            <a:r>
+              <a:rPr lang="en-US" altLang="en-US" sz="2000"/>
+              <a:t>H even, p</a:t>
+            </a:r>
+            <a:r>
+              <a:rPr lang="en-US" altLang="en-US" sz="2000" baseline="-25000"/>
+              <a:t>n</a:t>
+            </a:r>
+            <a:r>
+              <a:rPr lang="en-US" altLang="en-US" sz="2000"/>
+              <a:t> even, no error</a:t>
+            </a:r>
+          </a:p>
+          <a:p>
+            <a:pPr lvl="2"/>
+            <a:r>
+              <a:rPr lang="en-US" altLang="en-US" sz="2000"/>
+              <a:t>H odd, p</a:t>
+            </a:r>
+            <a:r>
+              <a:rPr lang="en-US" altLang="en-US" sz="2000" baseline="-25000"/>
+              <a:t>n</a:t>
+            </a:r>
+            <a:r>
+              <a:rPr lang="en-US" altLang="en-US" sz="2000"/>
+              <a:t> odd, correctable single bit error</a:t>
+            </a:r>
+          </a:p>
+          <a:p>
+            <a:pPr lvl="2"/>
+            <a:r>
+              <a:rPr lang="en-US" altLang="en-US" sz="2000"/>
+              <a:t>H even, p</a:t>
+            </a:r>
+            <a:r>
+              <a:rPr lang="en-US" altLang="en-US" sz="2000" baseline="-25000"/>
+              <a:t>n</a:t>
+            </a:r>
+            <a:r>
+              <a:rPr lang="en-US" altLang="en-US" sz="2000"/>
+              <a:t> odd, error in p</a:t>
+            </a:r>
+            <a:r>
+              <a:rPr lang="en-US" altLang="en-US" sz="2000" baseline="-25000"/>
+              <a:t>n</a:t>
+            </a:r>
+            <a:r>
+              <a:rPr lang="en-US" altLang="en-US" sz="2000"/>
+              <a:t> bit</a:t>
+            </a:r>
+          </a:p>
+          <a:p>
+            <a:pPr lvl="2"/>
+            <a:r>
+              <a:rPr lang="en-US" altLang="en-US" sz="2000"/>
+              <a:t>H odd, p</a:t>
+            </a:r>
+            <a:r>
+              <a:rPr lang="en-US" altLang="en-US" sz="2000" baseline="-25000"/>
+              <a:t>n</a:t>
+            </a:r>
+            <a:r>
+              <a:rPr lang="en-US" altLang="en-US" sz="2000"/>
+              <a:t> even, double error occurred</a:t>
+            </a:r>
+          </a:p>
+          <a:p>
+            <a:r>
+              <a:rPr lang="en-US" altLang="en-US" sz="2800"/>
+              <a:t>Note:  ECC DRAM uses SEC/DEC with 8 bits protecting each 64 bits</a:t>
+            </a:r>
+            <a:endParaRPr lang="en-US" altLang="en-US"/>
+          </a:p>
+        </p:txBody>
+      </p:sp>
+      <p:sp>
+        <p:nvSpPr>
+          <p:cNvPr id="66564" name="Footer Placeholder 3"/>
+          <p:cNvSpPr>
+            <a:spLocks noGrp="1"/>
+          </p:cNvSpPr>
+          <p:nvPr>
+            <p:ph type="ftr" sz="quarter" idx="10"/>
+          </p:nvPr>
+        </p:nvSpPr>
+        <p:spPr>
+          <a:noFill/>
+          <a:ln/>
+          <a:extLst>
+            <a:ext uri="{909E8E84-426E-40DD-AFC4-6F175D3DCCD1}">
+              <a14:hiddenFill xmlns:a14="http://schemas.microsoft.com/office/drawing/2010/main">
+                <a:solidFill>
+                  <a:srgbClr val="FFFFFF"/>
+                </a:solidFill>
+              </a14:hiddenFill>
+            </a:ext>
+            <a:ext uri="{91240B29-F687-4F45-9708-019B960494DF}">
+              <a14:hiddenLine xmlns:a14="http://schemas.microsoft.com/office/drawing/2010/main" w="9525">
+                <a:solidFill>
+                  <a:srgbClr val="000000"/>
+                </a:solidFill>
+                <a:miter lim="800000"/>
+                <a:headEnd/>
+                <a:tailEnd/>
+              </a14:hiddenLine>
+            </a:ext>
+          </a:extLst>
+        </p:spPr>
+        <p:txBody>
+          <a:bodyPr/>
+          <a:lstStyle>
+            <a:lvl1pPr>
+              <a:defRPr>
+                <a:solidFill>
+                  <a:schemeClr val="tx1"/>
+                </a:solidFill>
+                <a:latin typeface="Arial" charset="0"/>
+              </a:defRPr>
+            </a:lvl1pPr>
+            <a:lvl2pPr marL="742950" indent="-285750">
+              <a:defRPr>
+                <a:solidFill>
+                  <a:schemeClr val="tx1"/>
+                </a:solidFill>
+                <a:latin typeface="Arial" charset="0"/>
+              </a:defRPr>
+            </a:lvl2pPr>
+            <a:lvl3pPr marL="1143000" indent="-228600">
+              <a:defRPr>
+                <a:solidFill>
+                  <a:schemeClr val="tx1"/>
+                </a:solidFill>
+                <a:latin typeface="Arial" charset="0"/>
+              </a:defRPr>
+            </a:lvl3pPr>
+            <a:lvl4pPr marL="1600200" indent="-228600">
+              <a:defRPr>
+                <a:solidFill>
+                  <a:schemeClr val="tx1"/>
+                </a:solidFill>
+                <a:latin typeface="Arial" charset="0"/>
+              </a:defRPr>
+            </a:lvl4pPr>
+            <a:lvl5pPr marL="2057400" indent="-228600">
+              <a:defRPr>
+                <a:solidFill>
+                  <a:schemeClr val="tx1"/>
+                </a:solidFill>
+                <a:latin typeface="Arial" charset="0"/>
+              </a:defRPr>
+            </a:lvl5pPr>
+            <a:lvl6pPr marL="2514600" indent="-228600" eaLnBrk="0" fontAlgn="base" hangingPunct="0">
+              <a:spcBef>
+                <a:spcPct val="0"/>
+              </a:spcBef>
+              <a:spcAft>
+                <a:spcPct val="0"/>
+              </a:spcAft>
+              <a:defRPr>
+                <a:solidFill>
+                  <a:schemeClr val="tx1"/>
+                </a:solidFill>
+                <a:latin typeface="Arial" charset="0"/>
+              </a:defRPr>
+            </a:lvl6pPr>
+            <a:lvl7pPr marL="2971800" indent="-228600" eaLnBrk="0" fontAlgn="base" hangingPunct="0">
+              <a:spcBef>
+                <a:spcPct val="0"/>
+              </a:spcBef>
+              <a:spcAft>
+                <a:spcPct val="0"/>
+              </a:spcAft>
+              <a:defRPr>
+                <a:solidFill>
+                  <a:schemeClr val="tx1"/>
+                </a:solidFill>
+                <a:latin typeface="Arial" charset="0"/>
+              </a:defRPr>
+            </a:lvl7pPr>
+            <a:lvl8pPr marL="3429000" indent="-228600" eaLnBrk="0" fontAlgn="base" hangingPunct="0">
+              <a:spcBef>
+                <a:spcPct val="0"/>
+              </a:spcBef>
+              <a:spcAft>
+                <a:spcPct val="0"/>
+              </a:spcAft>
+              <a:defRPr>
+                <a:solidFill>
+                  <a:schemeClr val="tx1"/>
+                </a:solidFill>
+                <a:latin typeface="Arial" charset="0"/>
+              </a:defRPr>
+            </a:lvl8pPr>
+            <a:lvl9pPr marL="3886200" indent="-228600" eaLnBrk="0" fontAlgn="base" hangingPunct="0">
+              <a:spcBef>
+                <a:spcPct val="0"/>
+              </a:spcBef>
+              <a:spcAft>
+                <a:spcPct val="0"/>
+              </a:spcAft>
+              <a:defRPr>
+                <a:solidFill>
+                  <a:schemeClr val="tx1"/>
+                </a:solidFill>
+                <a:latin typeface="Arial" charset="0"/>
+              </a:defRPr>
+            </a:lvl9pPr>
+          </a:lstStyle>
+          <a:p>
+            <a:r>
+              <a:rPr lang="en-AU" altLang="en-US"/>
+              <a:t>Chapter 5 — Large and Fast: Exploiting Memory Hierarchy — </a:t>
+            </a:r>
+            <a:fld id="{37E58B1D-7427-814E-80E7-07162329234C}" type="slidenum">
+              <a:rPr lang="en-AU" altLang="en-US"/>
+              <a:pPr/>
+              <a:t>26</a:t>
+            </a:fld>
+            <a:endParaRPr lang="en-AU" altLang="en-US"/>
+          </a:p>
+        </p:txBody>
+      </p:sp>
+    </p:spTree>
+    <p:extLst>
+      <p:ext uri="{BB962C8B-B14F-4D97-AF65-F5344CB8AC3E}">
+        <p14:creationId xmlns:p14="http://schemas.microsoft.com/office/powerpoint/2010/main" val="203397180"/>
+      </p:ext>
+    </p:extLst>
+  </p:cSld>
+  <p:clrMapOvr>
+    <a:masterClrMapping/>
+  </p:clrMapOvr>
+  <p:timing>
+    <p:tnLst>
+      <p:par>
+        <p:cTn id="1" dur="indefinite" restart="never" nodeType="tmRoot"/>
+      </p:par>
+    </p:tnLst>
+  </p:timing>
+</p:sld>
+</file>
+
 <file path=ppt/slides/slide3.xml><?xml version="1.0" encoding="utf-8"?>
 <p:sld xmlns:a="http://schemas.openxmlformats.org/drawingml/2006/main" xmlns:r="http://schemas.openxmlformats.org/officeDocument/2006/relationships" xmlns:p="http://schemas.openxmlformats.org/presentationml/2006/main">
   <p:cSld>

</xml_diff>